<commit_message>
Added comments fo tree
</commit_message>
<xml_diff>
--- a/task2.pptx
+++ b/task2.pptx
@@ -5,22 +5,23 @@
     <p:sldMasterId id="2147483648" r:id="rId1"/>
   </p:sldMasterIdLst>
   <p:notesMasterIdLst>
-    <p:notesMasterId r:id="rId15"/>
+    <p:notesMasterId r:id="rId16"/>
   </p:notesMasterIdLst>
   <p:sldIdLst>
     <p:sldId id="256" r:id="rId2"/>
     <p:sldId id="257" r:id="rId3"/>
     <p:sldId id="258" r:id="rId4"/>
-    <p:sldId id="259" r:id="rId5"/>
-    <p:sldId id="260" r:id="rId6"/>
-    <p:sldId id="261" r:id="rId7"/>
-    <p:sldId id="262" r:id="rId8"/>
-    <p:sldId id="264" r:id="rId9"/>
-    <p:sldId id="263" r:id="rId10"/>
-    <p:sldId id="265" r:id="rId11"/>
-    <p:sldId id="266" r:id="rId12"/>
-    <p:sldId id="267" r:id="rId13"/>
-    <p:sldId id="268" r:id="rId14"/>
+    <p:sldId id="269" r:id="rId5"/>
+    <p:sldId id="259" r:id="rId6"/>
+    <p:sldId id="260" r:id="rId7"/>
+    <p:sldId id="261" r:id="rId8"/>
+    <p:sldId id="262" r:id="rId9"/>
+    <p:sldId id="264" r:id="rId10"/>
+    <p:sldId id="263" r:id="rId11"/>
+    <p:sldId id="265" r:id="rId12"/>
+    <p:sldId id="266" r:id="rId13"/>
+    <p:sldId id="267" r:id="rId14"/>
+    <p:sldId id="268" r:id="rId15"/>
   </p:sldIdLst>
   <p:sldSz cx="12192000" cy="6858000"/>
   <p:notesSz cx="6858000" cy="9144000"/>
@@ -328,6 +329,15 @@
     </p:ext>
   </p:extLst>
 </p:presentation>
+</file>
+
+<file path=ppt/revisionInfo.xml><?xml version="1.0" encoding="utf-8"?>
+<p1510:revInfo xmlns:a="http://schemas.openxmlformats.org/drawingml/2006/main" xmlns:r="http://schemas.openxmlformats.org/officeDocument/2006/relationships" xmlns:p1510="http://schemas.microsoft.com/office/powerpoint/2015/10/main">
+  <p1510:revLst>
+    <p1510:client id="{5149CA61-846E-4581-8A10-D63E3BC1B9A8}" v="55" dt="2021-01-18T12:45:18.537"/>
+    <p1510:client id="{D1218C0E-2367-4374-876A-2AE7A12D0C7F}" v="463" dt="2021-01-18T13:57:46.402"/>
+  </p1510:revLst>
+</p1510:revInfo>
 </file>
 
 <file path=ppt/notesMasters/notesMaster1.xml><?xml version="1.0" encoding="utf-8"?>
@@ -3065,6 +3075,138 @@
       </p:grpSpPr>
       <p:sp>
         <p:nvSpPr>
+          <p:cNvPr id="122" name="Заголовок 1"/>
+          <p:cNvSpPr txBox="1">
+            <a:spLocks noGrp="1"/>
+          </p:cNvSpPr>
+          <p:nvPr>
+            <p:ph type="title"/>
+          </p:nvPr>
+        </p:nvSpPr>
+        <p:spPr>
+          <a:xfrm>
+            <a:off x="532218" y="-353451"/>
+            <a:ext cx="10515601" cy="1325563"/>
+          </a:xfrm>
+          <a:prstGeom prst="rect">
+            <a:avLst/>
+          </a:prstGeom>
+        </p:spPr>
+        <p:txBody>
+          <a:bodyPr/>
+          <a:lstStyle>
+            <a:lvl1pPr algn="ctr"/>
+          </a:lstStyle>
+          <a:p>
+            <a:r>
+              <a:rPr dirty="0" err="1"/>
+              <a:t>Синтаксическое</a:t>
+            </a:r>
+            <a:r>
+              <a:rPr dirty="0"/>
+              <a:t> </a:t>
+            </a:r>
+            <a:r>
+              <a:rPr dirty="0" err="1"/>
+              <a:t>дерево</a:t>
+            </a:r>
+            <a:r>
+              <a:rPr dirty="0"/>
+              <a:t> </a:t>
+            </a:r>
+          </a:p>
+        </p:txBody>
+      </p:sp>
+      <p:sp>
+        <p:nvSpPr>
+          <p:cNvPr id="123" name="Текст 2"/>
+          <p:cNvSpPr txBox="1">
+            <a:spLocks noGrp="1"/>
+          </p:cNvSpPr>
+          <p:nvPr>
+            <p:ph type="body" idx="1"/>
+          </p:nvPr>
+        </p:nvSpPr>
+        <p:spPr>
+          <a:xfrm>
+            <a:off x="113118" y="609200"/>
+            <a:ext cx="11965764" cy="362912"/>
+          </a:xfrm>
+          <a:prstGeom prst="rect">
+            <a:avLst/>
+          </a:prstGeom>
+        </p:spPr>
+        <p:txBody>
+          <a:bodyPr>
+            <a:normAutofit fontScale="77500" lnSpcReduction="20000"/>
+          </a:bodyPr>
+          <a:lstStyle/>
+          <a:p>
+            <a:r>
+              <a:rPr dirty="0"/>
+              <a:t>c) John ate the salted big brown roasted peanut. </a:t>
+            </a:r>
+          </a:p>
+        </p:txBody>
+      </p:sp>
+      <p:pic>
+        <p:nvPicPr>
+          <p:cNvPr id="3" name="Рисунок 2">
+            <a:extLst>
+              <a:ext uri="{FF2B5EF4-FFF2-40B4-BE49-F238E27FC236}">
+                <a16:creationId xmlns:a16="http://schemas.microsoft.com/office/drawing/2014/main" id="{F289305A-A560-4C7F-83E9-EC582C9566EC}"/>
+              </a:ext>
+            </a:extLst>
+          </p:cNvPr>
+          <p:cNvPicPr>
+            <a:picLocks noChangeAspect="1"/>
+          </p:cNvPicPr>
+          <p:nvPr/>
+        </p:nvPicPr>
+        <p:blipFill>
+          <a:blip r:embed="rId2"/>
+          <a:stretch>
+            <a:fillRect/>
+          </a:stretch>
+        </p:blipFill>
+        <p:spPr>
+          <a:xfrm>
+            <a:off x="2052037" y="866031"/>
+            <a:ext cx="8087925" cy="5991969"/>
+          </a:xfrm>
+          <a:prstGeom prst="rect">
+            <a:avLst/>
+          </a:prstGeom>
+        </p:spPr>
+      </p:pic>
+    </p:spTree>
+  </p:cSld>
+  <p:clrMapOvr>
+    <a:masterClrMapping/>
+  </p:clrMapOvr>
+  <p:transition spd="med"/>
+</p:sld>
+</file>
+
+<file path=ppt/slides/slide11.xml><?xml version="1.0" encoding="utf-8"?>
+<p:sld xmlns:a="http://schemas.openxmlformats.org/drawingml/2006/main" xmlns:r="http://schemas.openxmlformats.org/officeDocument/2006/relationships" xmlns:p="http://schemas.openxmlformats.org/presentationml/2006/main">
+  <p:cSld>
+    <p:spTree>
+      <p:nvGrpSpPr>
+        <p:cNvPr id="1" name=""/>
+        <p:cNvGrpSpPr/>
+        <p:nvPr/>
+      </p:nvGrpSpPr>
+      <p:grpSpPr>
+        <a:xfrm>
+          <a:off x="0" y="0"/>
+          <a:ext cx="0" cy="0"/>
+          <a:chOff x="0" y="0"/>
+          <a:chExt cx="0" cy="0"/>
+        </a:xfrm>
+      </p:grpSpPr>
+      <p:sp>
+        <p:nvSpPr>
           <p:cNvPr id="129" name="Заголовок 1"/>
           <p:cNvSpPr txBox="1">
             <a:spLocks noGrp="1"/>
@@ -3137,7 +3279,7 @@
 </p:sld>
 </file>
 
-<file path=ppt/slides/slide11.xml><?xml version="1.0" encoding="utf-8"?>
+<file path=ppt/slides/slide12.xml><?xml version="1.0" encoding="utf-8"?>
 <p:sld xmlns:a="http://schemas.openxmlformats.org/drawingml/2006/main" xmlns:r="http://schemas.openxmlformats.org/officeDocument/2006/relationships" xmlns:p="http://schemas.openxmlformats.org/presentationml/2006/main">
   <p:cSld>
     <p:spTree>
@@ -3219,7 +3361,7 @@
 </p:sld>
 </file>
 
-<file path=ppt/slides/slide12.xml><?xml version="1.0" encoding="utf-8"?>
+<file path=ppt/slides/slide13.xml><?xml version="1.0" encoding="utf-8"?>
 <p:sld xmlns:a="http://schemas.openxmlformats.org/drawingml/2006/main" xmlns:r="http://schemas.openxmlformats.org/officeDocument/2006/relationships" xmlns:p="http://schemas.openxmlformats.org/presentationml/2006/main">
   <p:cSld>
     <p:spTree>
@@ -3898,7 +4040,7 @@
 </p:sld>
 </file>
 
-<file path=ppt/slides/slide13.xml><?xml version="1.0" encoding="utf-8"?>
+<file path=ppt/slides/slide14.xml><?xml version="1.0" encoding="utf-8"?>
 <p:sld xmlns:a="http://schemas.openxmlformats.org/drawingml/2006/main" xmlns:r="http://schemas.openxmlformats.org/officeDocument/2006/relationships" xmlns:p="http://schemas.openxmlformats.org/presentationml/2006/main">
   <p:cSld>
     <p:spTree>
@@ -7568,6 +7710,168 @@
       </p:grpSpPr>
       <p:sp>
         <p:nvSpPr>
+          <p:cNvPr id="2" name="Заголовок 1">
+            <a:extLst>
+              <a:ext uri="{FF2B5EF4-FFF2-40B4-BE49-F238E27FC236}">
+                <a16:creationId xmlns:a16="http://schemas.microsoft.com/office/drawing/2014/main" id="{95BD0FDC-F253-4CA1-A061-26E857795F52}"/>
+              </a:ext>
+            </a:extLst>
+          </p:cNvPr>
+          <p:cNvSpPr>
+            <a:spLocks noGrp="1"/>
+          </p:cNvSpPr>
+          <p:nvPr>
+            <p:ph type="title"/>
+          </p:nvPr>
+        </p:nvSpPr>
+        <p:spPr/>
+        <p:txBody>
+          <a:bodyPr/>
+          <a:lstStyle/>
+          <a:p>
+            <a:r>
+              <a:rPr lang="ru-RU" dirty="0"/>
+              <a:t>Принципы построения дерева</a:t>
+            </a:r>
+          </a:p>
+        </p:txBody>
+      </p:sp>
+      <p:sp>
+        <p:nvSpPr>
+          <p:cNvPr id="3" name="TextBox 2">
+            <a:extLst>
+              <a:ext uri="{FF2B5EF4-FFF2-40B4-BE49-F238E27FC236}">
+                <a16:creationId xmlns:a16="http://schemas.microsoft.com/office/drawing/2014/main" id="{339F7032-0F83-4FA8-9E04-3FE1013F4D0C}"/>
+              </a:ext>
+            </a:extLst>
+          </p:cNvPr>
+          <p:cNvSpPr txBox="1"/>
+          <p:nvPr/>
+        </p:nvSpPr>
+        <p:spPr>
+          <a:xfrm>
+            <a:off x="955589" y="1769074"/>
+            <a:ext cx="10527955" cy="3970314"/>
+          </a:xfrm>
+          <a:prstGeom prst="rect">
+            <a:avLst/>
+          </a:prstGeom>
+          <a:noFill/>
+          <a:ln w="12700" cap="flat">
+            <a:noFill/>
+            <a:miter lim="400000"/>
+          </a:ln>
+          <a:effectLst/>
+          <a:sp3d/>
+        </p:spPr>
+        <p:style>
+          <a:lnRef idx="0">
+            <a:scrgbClr r="0" g="0" b="0"/>
+          </a:lnRef>
+          <a:fillRef idx="0">
+            <a:scrgbClr r="0" g="0" b="0"/>
+          </a:fillRef>
+          <a:effectRef idx="0">
+            <a:scrgbClr r="0" g="0" b="0"/>
+          </a:effectRef>
+          <a:fontRef idx="none"/>
+        </p:style>
+        <p:txBody>
+          <a:bodyPr rot="0" spcFirstLastPara="1" vertOverflow="overflow" horzOverflow="overflow" vert="horz" wrap="square" lIns="45718" tIns="45718" rIns="45718" bIns="45718" numCol="1" spcCol="38100" rtlCol="0" fromWordArt="0" anchor="t" anchorCtr="0" forceAA="0" compatLnSpc="1">
+            <a:prstTxWarp prst="textNoShape">
+              <a:avLst/>
+            </a:prstTxWarp>
+            <a:spAutoFit/>
+          </a:bodyPr>
+          <a:lstStyle/>
+          <a:p>
+            <a:pPr algn="just"/>
+            <a:r>
+              <a:rPr lang="ru-RU" sz="2400" dirty="0"/>
+              <a:t>1) &lt;предложение&gt; выступает в качестве корневой синтаксической группы дерева</a:t>
+            </a:r>
+          </a:p>
+          <a:p>
+            <a:pPr algn="just"/>
+            <a:r>
+              <a:rPr lang="ru-RU" sz="2400" dirty="0"/>
+              <a:t>2)  базой рекурсии для предложения является простое предложение</a:t>
+            </a:r>
+          </a:p>
+          <a:p>
+            <a:pPr algn="just"/>
+            <a:r>
+              <a:rPr lang="ru-RU" sz="2400" dirty="0"/>
+              <a:t>3) входящие в состав простого предложения подлежащее и сказуемое делятся на соответствующие их грамматическим правилам части речи</a:t>
+            </a:r>
+            <a:endParaRPr lang="ru-RU" sz="2400" i="0" u="none" strike="noStrike" cap="none" spc="0" normalizeH="0" baseline="0" dirty="0">
+              <a:ln>
+                <a:noFill/>
+              </a:ln>
+              <a:solidFill>
+                <a:srgbClr val="000000"/>
+              </a:solidFill>
+              <a:effectLst/>
+              <a:uFillTx/>
+            </a:endParaRPr>
+          </a:p>
+          <a:p>
+            <a:pPr algn="just"/>
+            <a:r>
+              <a:rPr lang="ru-RU" sz="2400" dirty="0"/>
+              <a:t>4) синтаксические группы частей речи переходят в символьные константы, то есть конкретные слова</a:t>
+            </a:r>
+          </a:p>
+          <a:p>
+            <a:pPr algn="just"/>
+            <a:r>
+              <a:rPr lang="ru-RU" sz="2400" dirty="0"/>
+              <a:t>5) листья дерева - слова предложения - на них построение дерева завершается</a:t>
+            </a:r>
+          </a:p>
+          <a:p>
+            <a:pPr algn="just"/>
+            <a:endParaRPr lang="ru-RU" sz="2400" dirty="0"/>
+          </a:p>
+          <a:p>
+            <a:pPr algn="just"/>
+            <a:endParaRPr lang="ru-RU" sz="3600" dirty="0"/>
+          </a:p>
+        </p:txBody>
+      </p:sp>
+    </p:spTree>
+    <p:extLst>
+      <p:ext uri="{BB962C8B-B14F-4D97-AF65-F5344CB8AC3E}">
+        <p14:creationId xmlns:p14="http://schemas.microsoft.com/office/powerpoint/2010/main" val="2473059706"/>
+      </p:ext>
+    </p:extLst>
+  </p:cSld>
+  <p:clrMapOvr>
+    <a:masterClrMapping/>
+  </p:clrMapOvr>
+  <p:transition spd="med"/>
+</p:sld>
+</file>
+
+<file path=ppt/slides/slide5.xml><?xml version="1.0" encoding="utf-8"?>
+<p:sld xmlns:a="http://schemas.openxmlformats.org/drawingml/2006/main" xmlns:r="http://schemas.openxmlformats.org/officeDocument/2006/relationships" xmlns:p="http://schemas.openxmlformats.org/presentationml/2006/main">
+  <p:cSld>
+    <p:spTree>
+      <p:nvGrpSpPr>
+        <p:cNvPr id="1" name=""/>
+        <p:cNvGrpSpPr/>
+        <p:nvPr/>
+      </p:nvGrpSpPr>
+      <p:grpSpPr>
+        <a:xfrm>
+          <a:off x="0" y="0"/>
+          <a:ext cx="0" cy="0"/>
+          <a:chOff x="0" y="0"/>
+          <a:chExt cx="0" cy="0"/>
+        </a:xfrm>
+      </p:grpSpPr>
+      <p:sp>
+        <p:nvSpPr>
           <p:cNvPr id="106" name="«Eat at pleasure, drink with measure.»"/>
           <p:cNvSpPr txBox="1"/>
           <p:nvPr/>
@@ -7673,7 +7977,7 @@
         </p:blipFill>
         <p:spPr>
           <a:xfrm>
-            <a:off x="1348244" y="1782992"/>
+            <a:off x="699514" y="1834478"/>
             <a:ext cx="9495512" cy="5075188"/>
           </a:xfrm>
           <a:prstGeom prst="rect">
@@ -7692,7 +7996,7 @@
         </p:nvSpPr>
         <p:spPr>
           <a:xfrm>
-            <a:off x="6695894" y="1945810"/>
+            <a:off x="6098651" y="1904621"/>
             <a:ext cx="3923811" cy="333085"/>
           </a:xfrm>
           <a:prstGeom prst="rect">
@@ -7753,7 +8057,7 @@
 </p:sld>
 </file>
 
-<file path=ppt/slides/slide5.xml><?xml version="1.0" encoding="utf-8"?>
+<file path=ppt/slides/slide6.xml><?xml version="1.0" encoding="utf-8"?>
 <p:sld xmlns:a="http://schemas.openxmlformats.org/drawingml/2006/main" xmlns:r="http://schemas.openxmlformats.org/officeDocument/2006/relationships" xmlns:p="http://schemas.openxmlformats.org/presentationml/2006/main">
   <p:cSld>
     <p:spTree>
@@ -7897,7 +8201,7 @@
 </p:sld>
 </file>
 
-<file path=ppt/slides/slide6.xml><?xml version="1.0" encoding="utf-8"?>
+<file path=ppt/slides/slide7.xml><?xml version="1.0" encoding="utf-8"?>
 <p:sld xmlns:a="http://schemas.openxmlformats.org/drawingml/2006/main" xmlns:r="http://schemas.openxmlformats.org/officeDocument/2006/relationships" xmlns:p="http://schemas.openxmlformats.org/presentationml/2006/main">
   <p:cSld>
     <p:spTree>
@@ -8041,7 +8345,7 @@
 </p:sld>
 </file>
 
-<file path=ppt/slides/slide7.xml><?xml version="1.0" encoding="utf-8"?>
+<file path=ppt/slides/slide8.xml><?xml version="1.0" encoding="utf-8"?>
 <p:sld xmlns:a="http://schemas.openxmlformats.org/drawingml/2006/main" xmlns:r="http://schemas.openxmlformats.org/officeDocument/2006/relationships" xmlns:p="http://schemas.openxmlformats.org/presentationml/2006/main">
   <p:cSld>
     <p:spTree>
@@ -8215,7 +8519,7 @@
 </p:sld>
 </file>
 
-<file path=ppt/slides/slide8.xml><?xml version="1.0" encoding="utf-8"?>
+<file path=ppt/slides/slide9.xml><?xml version="1.0" encoding="utf-8"?>
 <p:sld xmlns:a="http://schemas.openxmlformats.org/drawingml/2006/main" xmlns:r="http://schemas.openxmlformats.org/officeDocument/2006/relationships" xmlns:p="http://schemas.openxmlformats.org/presentationml/2006/main">
   <p:cSld>
     <p:spTree>
@@ -8817,138 +9121,6 @@
           </a:p>
         </p:txBody>
       </p:sp>
-    </p:spTree>
-  </p:cSld>
-  <p:clrMapOvr>
-    <a:masterClrMapping/>
-  </p:clrMapOvr>
-  <p:transition spd="med"/>
-</p:sld>
-</file>
-
-<file path=ppt/slides/slide9.xml><?xml version="1.0" encoding="utf-8"?>
-<p:sld xmlns:a="http://schemas.openxmlformats.org/drawingml/2006/main" xmlns:r="http://schemas.openxmlformats.org/officeDocument/2006/relationships" xmlns:p="http://schemas.openxmlformats.org/presentationml/2006/main">
-  <p:cSld>
-    <p:spTree>
-      <p:nvGrpSpPr>
-        <p:cNvPr id="1" name=""/>
-        <p:cNvGrpSpPr/>
-        <p:nvPr/>
-      </p:nvGrpSpPr>
-      <p:grpSpPr>
-        <a:xfrm>
-          <a:off x="0" y="0"/>
-          <a:ext cx="0" cy="0"/>
-          <a:chOff x="0" y="0"/>
-          <a:chExt cx="0" cy="0"/>
-        </a:xfrm>
-      </p:grpSpPr>
-      <p:sp>
-        <p:nvSpPr>
-          <p:cNvPr id="122" name="Заголовок 1"/>
-          <p:cNvSpPr txBox="1">
-            <a:spLocks noGrp="1"/>
-          </p:cNvSpPr>
-          <p:nvPr>
-            <p:ph type="title"/>
-          </p:nvPr>
-        </p:nvSpPr>
-        <p:spPr>
-          <a:xfrm>
-            <a:off x="532218" y="-353451"/>
-            <a:ext cx="10515601" cy="1325563"/>
-          </a:xfrm>
-          <a:prstGeom prst="rect">
-            <a:avLst/>
-          </a:prstGeom>
-        </p:spPr>
-        <p:txBody>
-          <a:bodyPr/>
-          <a:lstStyle>
-            <a:lvl1pPr algn="ctr"/>
-          </a:lstStyle>
-          <a:p>
-            <a:r>
-              <a:rPr dirty="0" err="1"/>
-              <a:t>Синтаксическое</a:t>
-            </a:r>
-            <a:r>
-              <a:rPr dirty="0"/>
-              <a:t> </a:t>
-            </a:r>
-            <a:r>
-              <a:rPr dirty="0" err="1"/>
-              <a:t>дерево</a:t>
-            </a:r>
-            <a:r>
-              <a:rPr dirty="0"/>
-              <a:t> </a:t>
-            </a:r>
-          </a:p>
-        </p:txBody>
-      </p:sp>
-      <p:sp>
-        <p:nvSpPr>
-          <p:cNvPr id="123" name="Текст 2"/>
-          <p:cNvSpPr txBox="1">
-            <a:spLocks noGrp="1"/>
-          </p:cNvSpPr>
-          <p:nvPr>
-            <p:ph type="body" idx="1"/>
-          </p:nvPr>
-        </p:nvSpPr>
-        <p:spPr>
-          <a:xfrm>
-            <a:off x="113118" y="609200"/>
-            <a:ext cx="11965764" cy="362912"/>
-          </a:xfrm>
-          <a:prstGeom prst="rect">
-            <a:avLst/>
-          </a:prstGeom>
-        </p:spPr>
-        <p:txBody>
-          <a:bodyPr>
-            <a:normAutofit fontScale="77500" lnSpcReduction="20000"/>
-          </a:bodyPr>
-          <a:lstStyle/>
-          <a:p>
-            <a:r>
-              <a:rPr dirty="0"/>
-              <a:t>c) John ate the salted big brown roasted peanut. </a:t>
-            </a:r>
-          </a:p>
-        </p:txBody>
-      </p:sp>
-      <p:pic>
-        <p:nvPicPr>
-          <p:cNvPr id="3" name="Рисунок 2">
-            <a:extLst>
-              <a:ext uri="{FF2B5EF4-FFF2-40B4-BE49-F238E27FC236}">
-                <a16:creationId xmlns:a16="http://schemas.microsoft.com/office/drawing/2014/main" id="{F289305A-A560-4C7F-83E9-EC582C9566EC}"/>
-              </a:ext>
-            </a:extLst>
-          </p:cNvPr>
-          <p:cNvPicPr>
-            <a:picLocks noChangeAspect="1"/>
-          </p:cNvPicPr>
-          <p:nvPr/>
-        </p:nvPicPr>
-        <p:blipFill>
-          <a:blip r:embed="rId2"/>
-          <a:stretch>
-            <a:fillRect/>
-          </a:stretch>
-        </p:blipFill>
-        <p:spPr>
-          <a:xfrm>
-            <a:off x="2052037" y="866031"/>
-            <a:ext cx="8087925" cy="5991969"/>
-          </a:xfrm>
-          <a:prstGeom prst="rect">
-            <a:avLst/>
-          </a:prstGeom>
-        </p:spPr>
-      </p:pic>
     </p:spTree>
   </p:cSld>
   <p:clrMapOvr>

</xml_diff>